<commit_message>
Integer division could cancel small values of wrong sign
... as seen at some documents where the values are like -1. There
the checks in pushToPropMap may pass (the division result would be 0),
but the original small negative values would fail the asserts that
were introduced in commit 5772cef244dbee5834efbc693bc714d89ae6301d
  Author Mike Kaganski <mike.kaganski@collabora.com>
  Date   Wed Jun 15 18:33:38 2022 +0300
    tdf#134210: Reimplement cropping from srcRect and fillRect

Change-Id: I114588862b5cfd2b2e4491424430cc139bdbaae9
</commit_message>
<xml_diff>
--- a/sd/qa/unit/data/pptx/croppedTo0.pptx
+++ b/sd/qa/unit/data/pptx/croppedTo0.pptx
@@ -261,7 +261,7 @@
           <a:p>
             <a:fld id="{E23B18BD-E89D-4033-AA0F-0DA6FE00DCCC}" type="datetimeFigureOut">
               <a:rPr lang="ru-RU" smtClean="0"/>
-              <a:t>17.06.2022</a:t>
+              <a:t>27.06.2022</a:t>
             </a:fld>
             <a:endParaRPr lang="ru-RU"/>
           </a:p>
@@ -461,7 +461,7 @@
           <a:p>
             <a:fld id="{E23B18BD-E89D-4033-AA0F-0DA6FE00DCCC}" type="datetimeFigureOut">
               <a:rPr lang="ru-RU" smtClean="0"/>
-              <a:t>17.06.2022</a:t>
+              <a:t>27.06.2022</a:t>
             </a:fld>
             <a:endParaRPr lang="ru-RU"/>
           </a:p>
@@ -671,7 +671,7 @@
           <a:p>
             <a:fld id="{E23B18BD-E89D-4033-AA0F-0DA6FE00DCCC}" type="datetimeFigureOut">
               <a:rPr lang="ru-RU" smtClean="0"/>
-              <a:t>17.06.2022</a:t>
+              <a:t>27.06.2022</a:t>
             </a:fld>
             <a:endParaRPr lang="ru-RU"/>
           </a:p>
@@ -871,7 +871,7 @@
           <a:p>
             <a:fld id="{E23B18BD-E89D-4033-AA0F-0DA6FE00DCCC}" type="datetimeFigureOut">
               <a:rPr lang="ru-RU" smtClean="0"/>
-              <a:t>17.06.2022</a:t>
+              <a:t>27.06.2022</a:t>
             </a:fld>
             <a:endParaRPr lang="ru-RU"/>
           </a:p>
@@ -1147,7 +1147,7 @@
           <a:p>
             <a:fld id="{E23B18BD-E89D-4033-AA0F-0DA6FE00DCCC}" type="datetimeFigureOut">
               <a:rPr lang="ru-RU" smtClean="0"/>
-              <a:t>17.06.2022</a:t>
+              <a:t>27.06.2022</a:t>
             </a:fld>
             <a:endParaRPr lang="ru-RU"/>
           </a:p>
@@ -1415,7 +1415,7 @@
           <a:p>
             <a:fld id="{E23B18BD-E89D-4033-AA0F-0DA6FE00DCCC}" type="datetimeFigureOut">
               <a:rPr lang="ru-RU" smtClean="0"/>
-              <a:t>17.06.2022</a:t>
+              <a:t>27.06.2022</a:t>
             </a:fld>
             <a:endParaRPr lang="ru-RU"/>
           </a:p>
@@ -1830,7 +1830,7 @@
           <a:p>
             <a:fld id="{E23B18BD-E89D-4033-AA0F-0DA6FE00DCCC}" type="datetimeFigureOut">
               <a:rPr lang="ru-RU" smtClean="0"/>
-              <a:t>17.06.2022</a:t>
+              <a:t>27.06.2022</a:t>
             </a:fld>
             <a:endParaRPr lang="ru-RU"/>
           </a:p>
@@ -1972,7 +1972,7 @@
           <a:p>
             <a:fld id="{E23B18BD-E89D-4033-AA0F-0DA6FE00DCCC}" type="datetimeFigureOut">
               <a:rPr lang="ru-RU" smtClean="0"/>
-              <a:t>17.06.2022</a:t>
+              <a:t>27.06.2022</a:t>
             </a:fld>
             <a:endParaRPr lang="ru-RU"/>
           </a:p>
@@ -2085,7 +2085,7 @@
           <a:p>
             <a:fld id="{E23B18BD-E89D-4033-AA0F-0DA6FE00DCCC}" type="datetimeFigureOut">
               <a:rPr lang="ru-RU" smtClean="0"/>
-              <a:t>17.06.2022</a:t>
+              <a:t>27.06.2022</a:t>
             </a:fld>
             <a:endParaRPr lang="ru-RU"/>
           </a:p>
@@ -2398,7 +2398,7 @@
           <a:p>
             <a:fld id="{E23B18BD-E89D-4033-AA0F-0DA6FE00DCCC}" type="datetimeFigureOut">
               <a:rPr lang="ru-RU" smtClean="0"/>
-              <a:t>17.06.2022</a:t>
+              <a:t>27.06.2022</a:t>
             </a:fld>
             <a:endParaRPr lang="ru-RU"/>
           </a:p>
@@ -2687,7 +2687,7 @@
           <a:p>
             <a:fld id="{E23B18BD-E89D-4033-AA0F-0DA6FE00DCCC}" type="datetimeFigureOut">
               <a:rPr lang="ru-RU" smtClean="0"/>
-              <a:t>17.06.2022</a:t>
+              <a:t>27.06.2022</a:t>
             </a:fld>
             <a:endParaRPr lang="ru-RU"/>
           </a:p>
@@ -2930,7 +2930,7 @@
           <a:p>
             <a:fld id="{E23B18BD-E89D-4033-AA0F-0DA6FE00DCCC}" type="datetimeFigureOut">
               <a:rPr lang="ru-RU" smtClean="0"/>
-              <a:t>17.06.2022</a:t>
+              <a:t>27.06.2022</a:t>
             </a:fld>
             <a:endParaRPr lang="ru-RU"/>
           </a:p>
@@ -3382,6 +3382,38 @@
           </a:prstGeom>
         </p:spPr>
       </p:pic>
+      <p:pic>
+        <p:nvPicPr>
+          <p:cNvPr id="3" name="Picture 2">
+            <a:extLst>
+              <a:ext uri="{FF2B5EF4-FFF2-40B4-BE49-F238E27FC236}">
+                <a16:creationId xmlns:a16="http://schemas.microsoft.com/office/drawing/2014/main" id="{EE6FD19B-A7DB-4CAB-4771-36D2C5238470}"/>
+              </a:ext>
+            </a:extLst>
+          </p:cNvPr>
+          <p:cNvPicPr>
+            <a:picLocks noChangeAspect="1"/>
+          </p:cNvPicPr>
+          <p:nvPr/>
+        </p:nvPicPr>
+        <p:blipFill rotWithShape="1">
+          <a:blip r:embed="rId3" cstate="print"/>
+          <a:srcRect l="42751" r="-1" b="12700"/>
+          <a:stretch/>
+        </p:blipFill>
+        <p:spPr>
+          <a:xfrm>
+            <a:off x="7042858" y="66675"/>
+            <a:ext cx="2043991" cy="2352675"/>
+          </a:xfrm>
+          <a:prstGeom prst="roundRect">
+            <a:avLst/>
+          </a:prstGeom>
+          <a:effectLst>
+            <a:softEdge rad="127000"/>
+          </a:effectLst>
+        </p:spPr>
+      </p:pic>
     </p:spTree>
     <p:extLst>
       <p:ext uri="{BB962C8B-B14F-4D97-AF65-F5344CB8AC3E}">

</xml_diff>